<commit_message>
Basically working, and changes to presentation
</commit_message>
<xml_diff>
--- a/PeelingOnionArchitecture.pptx
+++ b/PeelingOnionArchitecture.pptx
@@ -5,9 +5,10 @@
     <p:sldMasterId id="2147483648" r:id="rId1"/>
   </p:sldMasterIdLst>
   <p:sldIdLst>
-    <p:sldId id="256" r:id="rId2"/>
-    <p:sldId id="257" r:id="rId3"/>
-    <p:sldId id="258" r:id="rId4"/>
+    <p:sldId id="259" r:id="rId2"/>
+    <p:sldId id="256" r:id="rId3"/>
+    <p:sldId id="257" r:id="rId4"/>
+    <p:sldId id="258" r:id="rId5"/>
   </p:sldIdLst>
   <p:sldSz cx="9144000" cy="6858000" type="screen4x3"/>
   <p:notesSz cx="6858000" cy="9144000"/>
@@ -291,7 +292,7 @@
             <a:fld id="{FEB3C0AF-D674-4A64-879B-AEC26E885096}" type="datetimeFigureOut">
               <a:rPr lang="en-US" smtClean="0"/>
               <a:pPr/>
-              <a:t>8/20/2012</a:t>
+              <a:t>8/25/2012</a:t>
             </a:fld>
             <a:endParaRPr lang="en-US"/>
           </a:p>
@@ -458,7 +459,7 @@
             <a:fld id="{FEB3C0AF-D674-4A64-879B-AEC26E885096}" type="datetimeFigureOut">
               <a:rPr lang="en-US" smtClean="0"/>
               <a:pPr/>
-              <a:t>8/20/2012</a:t>
+              <a:t>8/25/2012</a:t>
             </a:fld>
             <a:endParaRPr lang="en-US"/>
           </a:p>
@@ -635,7 +636,7 @@
             <a:fld id="{FEB3C0AF-D674-4A64-879B-AEC26E885096}" type="datetimeFigureOut">
               <a:rPr lang="en-US" smtClean="0"/>
               <a:pPr/>
-              <a:t>8/20/2012</a:t>
+              <a:t>8/25/2012</a:t>
             </a:fld>
             <a:endParaRPr lang="en-US"/>
           </a:p>
@@ -802,7 +803,7 @@
             <a:fld id="{FEB3C0AF-D674-4A64-879B-AEC26E885096}" type="datetimeFigureOut">
               <a:rPr lang="en-US" smtClean="0"/>
               <a:pPr/>
-              <a:t>8/20/2012</a:t>
+              <a:t>8/25/2012</a:t>
             </a:fld>
             <a:endParaRPr lang="en-US"/>
           </a:p>
@@ -1045,7 +1046,7 @@
             <a:fld id="{FEB3C0AF-D674-4A64-879B-AEC26E885096}" type="datetimeFigureOut">
               <a:rPr lang="en-US" smtClean="0"/>
               <a:pPr/>
-              <a:t>8/20/2012</a:t>
+              <a:t>8/25/2012</a:t>
             </a:fld>
             <a:endParaRPr lang="en-US"/>
           </a:p>
@@ -1330,7 +1331,7 @@
             <a:fld id="{FEB3C0AF-D674-4A64-879B-AEC26E885096}" type="datetimeFigureOut">
               <a:rPr lang="en-US" smtClean="0"/>
               <a:pPr/>
-              <a:t>8/20/2012</a:t>
+              <a:t>8/25/2012</a:t>
             </a:fld>
             <a:endParaRPr lang="en-US"/>
           </a:p>
@@ -1749,7 +1750,7 @@
             <a:fld id="{FEB3C0AF-D674-4A64-879B-AEC26E885096}" type="datetimeFigureOut">
               <a:rPr lang="en-US" smtClean="0"/>
               <a:pPr/>
-              <a:t>8/20/2012</a:t>
+              <a:t>8/25/2012</a:t>
             </a:fld>
             <a:endParaRPr lang="en-US"/>
           </a:p>
@@ -1864,7 +1865,7 @@
             <a:fld id="{FEB3C0AF-D674-4A64-879B-AEC26E885096}" type="datetimeFigureOut">
               <a:rPr lang="en-US" smtClean="0"/>
               <a:pPr/>
-              <a:t>8/20/2012</a:t>
+              <a:t>8/25/2012</a:t>
             </a:fld>
             <a:endParaRPr lang="en-US"/>
           </a:p>
@@ -1956,7 +1957,7 @@
             <a:fld id="{FEB3C0AF-D674-4A64-879B-AEC26E885096}" type="datetimeFigureOut">
               <a:rPr lang="en-US" smtClean="0"/>
               <a:pPr/>
-              <a:t>8/20/2012</a:t>
+              <a:t>8/25/2012</a:t>
             </a:fld>
             <a:endParaRPr lang="en-US"/>
           </a:p>
@@ -2230,7 +2231,7 @@
             <a:fld id="{FEB3C0AF-D674-4A64-879B-AEC26E885096}" type="datetimeFigureOut">
               <a:rPr lang="en-US" smtClean="0"/>
               <a:pPr/>
-              <a:t>8/20/2012</a:t>
+              <a:t>8/25/2012</a:t>
             </a:fld>
             <a:endParaRPr lang="en-US"/>
           </a:p>
@@ -2480,7 +2481,7 @@
             <a:fld id="{FEB3C0AF-D674-4A64-879B-AEC26E885096}" type="datetimeFigureOut">
               <a:rPr lang="en-US" smtClean="0"/>
               <a:pPr/>
-              <a:t>8/20/2012</a:t>
+              <a:t>8/25/2012</a:t>
             </a:fld>
             <a:endParaRPr lang="en-US"/>
           </a:p>
@@ -2690,7 +2691,7 @@
             <a:fld id="{FEB3C0AF-D674-4A64-879B-AEC26E885096}" type="datetimeFigureOut">
               <a:rPr lang="en-US" smtClean="0"/>
               <a:pPr/>
-              <a:t>8/20/2012</a:t>
+              <a:t>8/25/2012</a:t>
             </a:fld>
             <a:endParaRPr lang="en-US"/>
           </a:p>
@@ -3063,14 +3064,14 @@
       </p:grpSpPr>
       <p:sp>
         <p:nvSpPr>
-          <p:cNvPr id="6" name="Rectangle 5"/>
+          <p:cNvPr id="4" name="Rectangle 3"/>
           <p:cNvSpPr/>
           <p:nvPr/>
         </p:nvSpPr>
         <p:spPr>
           <a:xfrm>
             <a:off x="0" y="0"/>
-            <a:ext cx="9144000" cy="762000"/>
+            <a:ext cx="9144000" cy="6858000"/>
           </a:xfrm>
           <a:prstGeom prst="rect">
             <a:avLst/>
@@ -3109,7 +3110,7 @@
       </p:sp>
       <p:pic>
         <p:nvPicPr>
-          <p:cNvPr id="1028" name="Picture 4" descr="https://encrypted-tbn1.google.com/images?q=tbn:ANd9GcRAeioZ9awkYv5EkOoZwuaXTBl7_cEGxovI0i_y_tkTDDfIR3_Xag"/>
+          <p:cNvPr id="5" name="Picture 4" descr="https://encrypted-tbn1.google.com/images?q=tbn:ANd9GcRAeioZ9awkYv5EkOoZwuaXTBl7_cEGxovI0i_y_tkTDDfIR3_Xag"/>
           <p:cNvPicPr>
             <a:picLocks noChangeAspect="1" noChangeArrowheads="1"/>
           </p:cNvPicPr>
@@ -3124,8 +3125,8 @@
         </p:blipFill>
         <p:spPr bwMode="auto">
           <a:xfrm>
-            <a:off x="8126690" y="0"/>
-            <a:ext cx="1017309" cy="762000"/>
+            <a:off x="2819400" y="1679636"/>
+            <a:ext cx="3352800" cy="2511364"/>
           </a:xfrm>
           <a:prstGeom prst="rect">
             <a:avLst/>
@@ -3135,7 +3136,7 @@
       </p:pic>
       <p:sp>
         <p:nvSpPr>
-          <p:cNvPr id="7" name="TextBox 6"/>
+          <p:cNvPr id="6" name="TextBox 5"/>
           <p:cNvSpPr txBox="1"/>
           <p:nvPr/>
         </p:nvSpPr>
@@ -3179,14 +3180,14 @@
       </p:sp>
       <p:sp>
         <p:nvSpPr>
-          <p:cNvPr id="8" name="TextBox 7"/>
+          <p:cNvPr id="7" name="TextBox 6"/>
           <p:cNvSpPr txBox="1"/>
           <p:nvPr/>
         </p:nvSpPr>
         <p:spPr>
           <a:xfrm>
-            <a:off x="304800" y="914400"/>
-            <a:ext cx="8534400" cy="3139321"/>
+            <a:off x="2895600" y="4343400"/>
+            <a:ext cx="3124200" cy="369332"/>
           </a:xfrm>
           <a:prstGeom prst="rect">
             <a:avLst/>
@@ -3199,207 +3200,29 @@
           </a:bodyPr>
           <a:lstStyle/>
           <a:p>
-            <a:r>
-              <a:rPr lang="en-US" b="1" dirty="0" smtClean="0">
+            <a:pPr algn="ctr"/>
+            <a:r>
+              <a:rPr lang="en-US" dirty="0" smtClean="0">
                 <a:solidFill>
-                  <a:srgbClr val="200C0A"/>
+                  <a:schemeClr val="bg1"/>
                 </a:solidFill>
               </a:rPr>
-              <a:t>So what is “Onion Architecture”?</a:t>
-            </a:r>
-          </a:p>
-          <a:p>
-            <a:endParaRPr lang="en-US" b="1" dirty="0" smtClean="0">
+              <a:t>Laurence Blackledge</a:t>
+            </a:r>
+            <a:endParaRPr lang="en-US" dirty="0">
               <a:solidFill>
-                <a:srgbClr val="200C0A"/>
+                <a:schemeClr val="bg1"/>
               </a:solidFill>
             </a:endParaRPr>
           </a:p>
-          <a:p>
-            <a:pPr>
-              <a:buFont typeface="Arial" pitchFamily="34" charset="0"/>
-              <a:buChar char="•"/>
-            </a:pPr>
-            <a:r>
-              <a:rPr lang="en-US" dirty="0" smtClean="0">
-                <a:solidFill>
-                  <a:srgbClr val="200C0A"/>
-                </a:solidFill>
-              </a:rPr>
-              <a:t> Coined by Jeffery Palermo in a series of blog articles (Jul ’08)</a:t>
-            </a:r>
-          </a:p>
-          <a:p>
-            <a:pPr>
-              <a:buFont typeface="Arial" pitchFamily="34" charset="0"/>
-              <a:buChar char="•"/>
-            </a:pPr>
-            <a:endParaRPr lang="en-US" dirty="0" smtClean="0">
-              <a:solidFill>
-                <a:srgbClr val="200C0A"/>
-              </a:solidFill>
-            </a:endParaRPr>
-          </a:p>
-          <a:p>
-            <a:pPr>
-              <a:buFont typeface="Arial" pitchFamily="34" charset="0"/>
-              <a:buChar char="•"/>
-            </a:pPr>
-            <a:r>
-              <a:rPr lang="en-US" dirty="0" smtClean="0">
-                <a:solidFill>
-                  <a:srgbClr val="200C0A"/>
-                </a:solidFill>
-              </a:rPr>
-              <a:t> So called because it heavily encourages layers of separation between:</a:t>
-            </a:r>
-          </a:p>
-          <a:p>
-            <a:endParaRPr lang="en-US" dirty="0" smtClean="0">
-              <a:solidFill>
-                <a:srgbClr val="200C0A"/>
-              </a:solidFill>
-            </a:endParaRPr>
-          </a:p>
-          <a:p>
-            <a:pPr lvl="1">
-              <a:buFont typeface="Courier New" pitchFamily="49" charset="0"/>
-              <a:buChar char="o"/>
-            </a:pPr>
-            <a:r>
-              <a:rPr lang="en-US" dirty="0" smtClean="0">
-                <a:solidFill>
-                  <a:srgbClr val="200C0A"/>
-                </a:solidFill>
-              </a:rPr>
-              <a:t> Core: Domain model, classes, interfaces for everything, business logic</a:t>
-            </a:r>
-          </a:p>
-          <a:p>
-            <a:pPr lvl="1">
-              <a:buFont typeface="Courier New" pitchFamily="49" charset="0"/>
-              <a:buChar char="o"/>
-            </a:pPr>
-            <a:endParaRPr lang="en-US" dirty="0" smtClean="0">
-              <a:solidFill>
-                <a:srgbClr val="200C0A"/>
-              </a:solidFill>
-            </a:endParaRPr>
-          </a:p>
-          <a:p>
-            <a:pPr lvl="1">
-              <a:buFont typeface="Courier New" pitchFamily="49" charset="0"/>
-              <a:buChar char="o"/>
-            </a:pPr>
-            <a:r>
-              <a:rPr lang="en-US" dirty="0" smtClean="0">
-                <a:solidFill>
-                  <a:srgbClr val="200C0A"/>
-                </a:solidFill>
-              </a:rPr>
-              <a:t> Infrastructure: implementations of interfaces from core, mainly data persistence</a:t>
-            </a:r>
-          </a:p>
-          <a:p>
-            <a:pPr lvl="1">
-              <a:buFont typeface="Courier New" pitchFamily="49" charset="0"/>
-              <a:buChar char="o"/>
-            </a:pPr>
-            <a:endParaRPr lang="en-US" dirty="0" smtClean="0">
-              <a:solidFill>
-                <a:srgbClr val="200C0A"/>
-              </a:solidFill>
-            </a:endParaRPr>
-          </a:p>
-          <a:p>
-            <a:pPr lvl="1">
-              <a:buFont typeface="Courier New" pitchFamily="49" charset="0"/>
-              <a:buChar char="o"/>
-            </a:pPr>
-            <a:r>
-              <a:rPr lang="en-US" dirty="0" smtClean="0">
-                <a:solidFill>
-                  <a:srgbClr val="200C0A"/>
-                </a:solidFill>
-              </a:rPr>
-              <a:t> UI: Whatever tech you want, but it can only reference </a:t>
-            </a:r>
-            <a:r>
-              <a:rPr lang="en-US" dirty="0" smtClean="0">
-                <a:solidFill>
-                  <a:srgbClr val="200C0A"/>
-                </a:solidFill>
-              </a:rPr>
-              <a:t>core</a:t>
-            </a:r>
-            <a:endParaRPr lang="en-US" dirty="0" smtClean="0">
-              <a:solidFill>
-                <a:srgbClr val="200C0A"/>
-              </a:solidFill>
-            </a:endParaRPr>
-          </a:p>
-        </p:txBody>
-      </p:sp>
-      <p:pic>
-        <p:nvPicPr>
-          <p:cNvPr id="1030" name="Picture 6" descr="http://jeffreypalermo.com/files/media/image/WindowsLiveWriter/TheOnionArchitecturepart1_70A9/image%7B0%7D%5B59%5D.png"/>
-          <p:cNvPicPr>
-            <a:picLocks noChangeAspect="1" noChangeArrowheads="1"/>
-          </p:cNvPicPr>
-          <p:nvPr/>
-        </p:nvPicPr>
-        <p:blipFill>
-          <a:blip r:embed="rId3" cstate="print"/>
-          <a:srcRect/>
-          <a:stretch>
-            <a:fillRect/>
-          </a:stretch>
-        </p:blipFill>
-        <p:spPr bwMode="auto">
-          <a:xfrm>
-            <a:off x="2743200" y="4191000"/>
-            <a:ext cx="3486150" cy="2466975"/>
-          </a:xfrm>
-          <a:prstGeom prst="rect">
-            <a:avLst/>
-          </a:prstGeom>
-          <a:noFill/>
-        </p:spPr>
-      </p:pic>
-      <p:sp>
-        <p:nvSpPr>
-          <p:cNvPr id="10" name="TextBox 9"/>
-          <p:cNvSpPr txBox="1"/>
-          <p:nvPr/>
-        </p:nvSpPr>
-        <p:spPr>
-          <a:xfrm>
-            <a:off x="3200400" y="6629400"/>
-            <a:ext cx="2514600" cy="184666"/>
-          </a:xfrm>
-          <a:prstGeom prst="rect">
-            <a:avLst/>
-          </a:prstGeom>
-          <a:noFill/>
-        </p:spPr>
-        <p:txBody>
-          <a:bodyPr wrap="square" rtlCol="0">
-            <a:spAutoFit/>
-          </a:bodyPr>
-          <a:lstStyle/>
-          <a:p>
-            <a:pPr algn="ctr"/>
-            <a:r>
-              <a:rPr lang="en-US" sz="600" dirty="0" smtClean="0">
-                <a:hlinkClick r:id="rId4"/>
-              </a:rPr>
-              <a:t>http://jeffreypalermo.com/blog/the-onion-architecture-part-1/</a:t>
-            </a:r>
-            <a:endParaRPr lang="en-US" sz="600" dirty="0"/>
-          </a:p>
         </p:txBody>
       </p:sp>
     </p:spTree>
+    <p:extLst>
+      <p:ext uri="{BB962C8B-B14F-4D97-AF65-F5344CB8AC3E}">
+        <p14:creationId xmlns:p14="http://schemas.microsoft.com/office/powerpoint/2010/main" val="3513415854"/>
+      </p:ext>
+    </p:extLst>
   </p:cSld>
   <p:clrMapOvr>
     <a:masterClrMapping/>
@@ -3433,7 +3256,7 @@
       </p:grpSpPr>
       <p:sp>
         <p:nvSpPr>
-          <p:cNvPr id="4" name="Rectangle 3"/>
+          <p:cNvPr id="6" name="Rectangle 5"/>
           <p:cNvSpPr/>
           <p:nvPr/>
         </p:nvSpPr>
@@ -3479,6 +3302,363 @@
       </p:sp>
       <p:pic>
         <p:nvPicPr>
+          <p:cNvPr id="1028" name="Picture 4" descr="https://encrypted-tbn1.google.com/images?q=tbn:ANd9GcRAeioZ9awkYv5EkOoZwuaXTBl7_cEGxovI0i_y_tkTDDfIR3_Xag"/>
+          <p:cNvPicPr>
+            <a:picLocks noChangeAspect="1" noChangeArrowheads="1"/>
+          </p:cNvPicPr>
+          <p:nvPr/>
+        </p:nvPicPr>
+        <p:blipFill>
+          <a:blip r:embed="rId2" cstate="print"/>
+          <a:srcRect/>
+          <a:stretch>
+            <a:fillRect/>
+          </a:stretch>
+        </p:blipFill>
+        <p:spPr bwMode="auto">
+          <a:xfrm>
+            <a:off x="8126690" y="0"/>
+            <a:ext cx="1017309" cy="762000"/>
+          </a:xfrm>
+          <a:prstGeom prst="rect">
+            <a:avLst/>
+          </a:prstGeom>
+          <a:noFill/>
+        </p:spPr>
+      </p:pic>
+      <p:sp>
+        <p:nvSpPr>
+          <p:cNvPr id="7" name="TextBox 6"/>
+          <p:cNvSpPr txBox="1"/>
+          <p:nvPr/>
+        </p:nvSpPr>
+        <p:spPr>
+          <a:xfrm>
+            <a:off x="76200" y="76200"/>
+            <a:ext cx="4876800" cy="584775"/>
+          </a:xfrm>
+          <a:prstGeom prst="rect">
+            <a:avLst/>
+          </a:prstGeom>
+          <a:noFill/>
+        </p:spPr>
+        <p:txBody>
+          <a:bodyPr wrap="square" rtlCol="0">
+            <a:spAutoFit/>
+          </a:bodyPr>
+          <a:lstStyle/>
+          <a:p>
+            <a:r>
+              <a:rPr lang="en-US" sz="3200" dirty="0" smtClean="0">
+                <a:solidFill>
+                  <a:schemeClr val="accent6">
+                    <a:lumMod val="40000"/>
+                    <a:lumOff val="60000"/>
+                  </a:schemeClr>
+                </a:solidFill>
+              </a:rPr>
+              <a:t>Peeling Onion Architecture</a:t>
+            </a:r>
+            <a:endParaRPr lang="en-US" sz="3200" dirty="0">
+              <a:solidFill>
+                <a:schemeClr val="accent6">
+                  <a:lumMod val="40000"/>
+                  <a:lumOff val="60000"/>
+                </a:schemeClr>
+              </a:solidFill>
+            </a:endParaRPr>
+          </a:p>
+        </p:txBody>
+      </p:sp>
+      <p:sp>
+        <p:nvSpPr>
+          <p:cNvPr id="8" name="TextBox 7"/>
+          <p:cNvSpPr txBox="1"/>
+          <p:nvPr/>
+        </p:nvSpPr>
+        <p:spPr>
+          <a:xfrm>
+            <a:off x="304800" y="914400"/>
+            <a:ext cx="8534400" cy="3139321"/>
+          </a:xfrm>
+          <a:prstGeom prst="rect">
+            <a:avLst/>
+          </a:prstGeom>
+          <a:noFill/>
+        </p:spPr>
+        <p:txBody>
+          <a:bodyPr wrap="square" rtlCol="0">
+            <a:spAutoFit/>
+          </a:bodyPr>
+          <a:lstStyle/>
+          <a:p>
+            <a:r>
+              <a:rPr lang="en-US" b="1" dirty="0" smtClean="0">
+                <a:solidFill>
+                  <a:srgbClr val="200C0A"/>
+                </a:solidFill>
+              </a:rPr>
+              <a:t>So what is “Onion Architecture”?</a:t>
+            </a:r>
+          </a:p>
+          <a:p>
+            <a:endParaRPr lang="en-US" b="1" dirty="0" smtClean="0">
+              <a:solidFill>
+                <a:srgbClr val="200C0A"/>
+              </a:solidFill>
+            </a:endParaRPr>
+          </a:p>
+          <a:p>
+            <a:pPr>
+              <a:buFont typeface="Arial" pitchFamily="34" charset="0"/>
+              <a:buChar char="•"/>
+            </a:pPr>
+            <a:r>
+              <a:rPr lang="en-US" dirty="0" smtClean="0">
+                <a:solidFill>
+                  <a:srgbClr val="200C0A"/>
+                </a:solidFill>
+              </a:rPr>
+              <a:t> Coined by Jeffery Palermo in a series of blog articles (Jul ’08)</a:t>
+            </a:r>
+          </a:p>
+          <a:p>
+            <a:pPr>
+              <a:buFont typeface="Arial" pitchFamily="34" charset="0"/>
+              <a:buChar char="•"/>
+            </a:pPr>
+            <a:endParaRPr lang="en-US" dirty="0" smtClean="0">
+              <a:solidFill>
+                <a:srgbClr val="200C0A"/>
+              </a:solidFill>
+            </a:endParaRPr>
+          </a:p>
+          <a:p>
+            <a:pPr>
+              <a:buFont typeface="Arial" pitchFamily="34" charset="0"/>
+              <a:buChar char="•"/>
+            </a:pPr>
+            <a:r>
+              <a:rPr lang="en-US" dirty="0" smtClean="0">
+                <a:solidFill>
+                  <a:srgbClr val="200C0A"/>
+                </a:solidFill>
+              </a:rPr>
+              <a:t> So called because it heavily encourages layers of separation between:</a:t>
+            </a:r>
+          </a:p>
+          <a:p>
+            <a:endParaRPr lang="en-US" dirty="0" smtClean="0">
+              <a:solidFill>
+                <a:srgbClr val="200C0A"/>
+              </a:solidFill>
+            </a:endParaRPr>
+          </a:p>
+          <a:p>
+            <a:pPr lvl="1">
+              <a:buFont typeface="Courier New" pitchFamily="49" charset="0"/>
+              <a:buChar char="o"/>
+            </a:pPr>
+            <a:r>
+              <a:rPr lang="en-US" dirty="0" smtClean="0">
+                <a:solidFill>
+                  <a:srgbClr val="200C0A"/>
+                </a:solidFill>
+              </a:rPr>
+              <a:t> Core: Domain model, classes, interfaces for everything, business logic</a:t>
+            </a:r>
+          </a:p>
+          <a:p>
+            <a:pPr lvl="1">
+              <a:buFont typeface="Courier New" pitchFamily="49" charset="0"/>
+              <a:buChar char="o"/>
+            </a:pPr>
+            <a:endParaRPr lang="en-US" dirty="0" smtClean="0">
+              <a:solidFill>
+                <a:srgbClr val="200C0A"/>
+              </a:solidFill>
+            </a:endParaRPr>
+          </a:p>
+          <a:p>
+            <a:pPr lvl="1">
+              <a:buFont typeface="Courier New" pitchFamily="49" charset="0"/>
+              <a:buChar char="o"/>
+            </a:pPr>
+            <a:r>
+              <a:rPr lang="en-US" dirty="0" smtClean="0">
+                <a:solidFill>
+                  <a:srgbClr val="200C0A"/>
+                </a:solidFill>
+              </a:rPr>
+              <a:t> Infrastructure: implementations of interfaces from core, mainly data persistence</a:t>
+            </a:r>
+          </a:p>
+          <a:p>
+            <a:pPr lvl="1">
+              <a:buFont typeface="Courier New" pitchFamily="49" charset="0"/>
+              <a:buChar char="o"/>
+            </a:pPr>
+            <a:endParaRPr lang="en-US" dirty="0" smtClean="0">
+              <a:solidFill>
+                <a:srgbClr val="200C0A"/>
+              </a:solidFill>
+            </a:endParaRPr>
+          </a:p>
+          <a:p>
+            <a:pPr lvl="1">
+              <a:buFont typeface="Courier New" pitchFamily="49" charset="0"/>
+              <a:buChar char="o"/>
+            </a:pPr>
+            <a:r>
+              <a:rPr lang="en-US" dirty="0" smtClean="0">
+                <a:solidFill>
+                  <a:srgbClr val="200C0A"/>
+                </a:solidFill>
+              </a:rPr>
+              <a:t> UI: Whatever tech you want, but it can only reference core</a:t>
+            </a:r>
+          </a:p>
+        </p:txBody>
+      </p:sp>
+      <p:pic>
+        <p:nvPicPr>
+          <p:cNvPr id="1030" name="Picture 6" descr="http://jeffreypalermo.com/files/media/image/WindowsLiveWriter/TheOnionArchitecturepart1_70A9/image%7B0%7D%5B59%5D.png"/>
+          <p:cNvPicPr>
+            <a:picLocks noChangeAspect="1" noChangeArrowheads="1"/>
+          </p:cNvPicPr>
+          <p:nvPr/>
+        </p:nvPicPr>
+        <p:blipFill>
+          <a:blip r:embed="rId3" cstate="print"/>
+          <a:srcRect/>
+          <a:stretch>
+            <a:fillRect/>
+          </a:stretch>
+        </p:blipFill>
+        <p:spPr bwMode="auto">
+          <a:xfrm>
+            <a:off x="2743200" y="4191000"/>
+            <a:ext cx="3486150" cy="2466975"/>
+          </a:xfrm>
+          <a:prstGeom prst="rect">
+            <a:avLst/>
+          </a:prstGeom>
+          <a:noFill/>
+        </p:spPr>
+      </p:pic>
+      <p:sp>
+        <p:nvSpPr>
+          <p:cNvPr id="10" name="TextBox 9"/>
+          <p:cNvSpPr txBox="1"/>
+          <p:nvPr/>
+        </p:nvSpPr>
+        <p:spPr>
+          <a:xfrm>
+            <a:off x="3200400" y="6629400"/>
+            <a:ext cx="2514600" cy="184666"/>
+          </a:xfrm>
+          <a:prstGeom prst="rect">
+            <a:avLst/>
+          </a:prstGeom>
+          <a:noFill/>
+        </p:spPr>
+        <p:txBody>
+          <a:bodyPr wrap="square" rtlCol="0">
+            <a:spAutoFit/>
+          </a:bodyPr>
+          <a:lstStyle/>
+          <a:p>
+            <a:pPr algn="ctr"/>
+            <a:r>
+              <a:rPr lang="en-US" sz="600" dirty="0" smtClean="0">
+                <a:hlinkClick r:id="rId4"/>
+              </a:rPr>
+              <a:t>http://jeffreypalermo.com/blog/the-onion-architecture-part-1/</a:t>
+            </a:r>
+            <a:endParaRPr lang="en-US" sz="600" dirty="0"/>
+          </a:p>
+        </p:txBody>
+      </p:sp>
+    </p:spTree>
+  </p:cSld>
+  <p:clrMapOvr>
+    <a:masterClrMapping/>
+  </p:clrMapOvr>
+  <p:timing>
+    <p:tnLst>
+      <p:par>
+        <p:cTn id="1" dur="indefinite" restart="never" nodeType="tmRoot"/>
+      </p:par>
+    </p:tnLst>
+  </p:timing>
+</p:sld>
+</file>
+
+<file path=ppt/slides/slide3.xml><?xml version="1.0" encoding="utf-8"?>
+<p:sld xmlns:a="http://schemas.openxmlformats.org/drawingml/2006/main" xmlns:r="http://schemas.openxmlformats.org/officeDocument/2006/relationships" xmlns:p="http://schemas.openxmlformats.org/presentationml/2006/main">
+  <p:cSld>
+    <p:spTree>
+      <p:nvGrpSpPr>
+        <p:cNvPr id="1" name=""/>
+        <p:cNvGrpSpPr/>
+        <p:nvPr/>
+      </p:nvGrpSpPr>
+      <p:grpSpPr>
+        <a:xfrm>
+          <a:off x="0" y="0"/>
+          <a:ext cx="0" cy="0"/>
+          <a:chOff x="0" y="0"/>
+          <a:chExt cx="0" cy="0"/>
+        </a:xfrm>
+      </p:grpSpPr>
+      <p:sp>
+        <p:nvSpPr>
+          <p:cNvPr id="4" name="Rectangle 3"/>
+          <p:cNvSpPr/>
+          <p:nvPr/>
+        </p:nvSpPr>
+        <p:spPr>
+          <a:xfrm>
+            <a:off x="0" y="0"/>
+            <a:ext cx="9144000" cy="762000"/>
+          </a:xfrm>
+          <a:prstGeom prst="rect">
+            <a:avLst/>
+          </a:prstGeom>
+          <a:solidFill>
+            <a:srgbClr val="200C0A"/>
+          </a:solidFill>
+          <a:ln>
+            <a:noFill/>
+          </a:ln>
+        </p:spPr>
+        <p:style>
+          <a:lnRef idx="2">
+            <a:schemeClr val="dk1">
+              <a:shade val="50000"/>
+            </a:schemeClr>
+          </a:lnRef>
+          <a:fillRef idx="1">
+            <a:schemeClr val="dk1"/>
+          </a:fillRef>
+          <a:effectRef idx="0">
+            <a:schemeClr val="dk1"/>
+          </a:effectRef>
+          <a:fontRef idx="minor">
+            <a:schemeClr val="lt1"/>
+          </a:fontRef>
+        </p:style>
+        <p:txBody>
+          <a:bodyPr rtlCol="0" anchor="ctr"/>
+          <a:lstStyle/>
+          <a:p>
+            <a:pPr algn="ctr"/>
+            <a:endParaRPr lang="en-US"/>
+          </a:p>
+        </p:txBody>
+      </p:sp>
+      <p:pic>
+        <p:nvPicPr>
           <p:cNvPr id="5" name="Picture 4" descr="https://encrypted-tbn1.google.com/images?q=tbn:ANd9GcRAeioZ9awkYv5EkOoZwuaXTBl7_cEGxovI0i_y_tkTDDfIR3_Xag"/>
           <p:cNvPicPr>
             <a:picLocks noChangeAspect="1" noChangeArrowheads="1"/>
@@ -3727,7 +3907,6 @@
               <a:rPr lang="en-US" b="1" dirty="0" smtClean="0"/>
               <a:t>Principles:</a:t>
             </a:r>
-            <a:endParaRPr lang="en-US" b="1" dirty="0" smtClean="0"/>
           </a:p>
           <a:p>
             <a:r>
@@ -4155,10 +4334,17 @@
   <p:clrMapOvr>
     <a:masterClrMapping/>
   </p:clrMapOvr>
+  <p:timing>
+    <p:tnLst>
+      <p:par>
+        <p:cTn id="1" dur="indefinite" restart="never" nodeType="tmRoot"/>
+      </p:par>
+    </p:tnLst>
+  </p:timing>
 </p:sld>
 </file>
 
-<file path=ppt/slides/slide3.xml><?xml version="1.0" encoding="utf-8"?>
+<file path=ppt/slides/slide4.xml><?xml version="1.0" encoding="utf-8"?>
 <p:sld xmlns:a="http://schemas.openxmlformats.org/drawingml/2006/main" xmlns:r="http://schemas.openxmlformats.org/officeDocument/2006/relationships" xmlns:p="http://schemas.openxmlformats.org/presentationml/2006/main">
   <p:cSld>
     <p:spTree>
@@ -4299,7 +4485,7 @@
         </p:nvSpPr>
         <p:spPr>
           <a:xfrm>
-            <a:off x="304800" y="2103090"/>
+            <a:off x="304800" y="533400"/>
             <a:ext cx="8534400" cy="3154710"/>
           </a:xfrm>
           <a:prstGeom prst="rect">
@@ -4327,6 +4513,117 @@
                 <a:srgbClr val="200C0A"/>
               </a:solidFill>
             </a:endParaRPr>
+          </a:p>
+        </p:txBody>
+      </p:sp>
+      <p:sp>
+        <p:nvSpPr>
+          <p:cNvPr id="2" name="TextBox 1"/>
+          <p:cNvSpPr txBox="1"/>
+          <p:nvPr/>
+        </p:nvSpPr>
+        <p:spPr>
+          <a:xfrm>
+            <a:off x="533400" y="6029980"/>
+            <a:ext cx="8001000" cy="523220"/>
+          </a:xfrm>
+          <a:prstGeom prst="rect">
+            <a:avLst/>
+          </a:prstGeom>
+          <a:noFill/>
+        </p:spPr>
+        <p:txBody>
+          <a:bodyPr wrap="square" rtlCol="0">
+            <a:spAutoFit/>
+          </a:bodyPr>
+          <a:lstStyle/>
+          <a:p>
+            <a:r>
+              <a:rPr lang="en-US" sz="1400" dirty="0" smtClean="0"/>
+              <a:t>Laurence Blackledge						@</a:t>
+            </a:r>
+            <a:r>
+              <a:rPr lang="en-US" sz="1400" dirty="0" err="1" smtClean="0"/>
+              <a:t>l_blackledge</a:t>
+            </a:r>
+            <a:endParaRPr lang="en-US" sz="1400" dirty="0" smtClean="0"/>
+          </a:p>
+          <a:p>
+            <a:r>
+              <a:rPr lang="en-US" sz="1400" dirty="0">
+                <a:hlinkClick r:id="rId3"/>
+              </a:rPr>
+              <a:t>https://github.com/lwblackledge/PeelingOnionArchitecture</a:t>
+            </a:r>
+            <a:endParaRPr lang="en-US" sz="1400" dirty="0"/>
+          </a:p>
+        </p:txBody>
+      </p:sp>
+      <p:sp>
+        <p:nvSpPr>
+          <p:cNvPr id="3" name="TextBox 2"/>
+          <p:cNvSpPr txBox="1"/>
+          <p:nvPr/>
+        </p:nvSpPr>
+        <p:spPr>
+          <a:xfrm>
+            <a:off x="609600" y="3733800"/>
+            <a:ext cx="7848600" cy="1754326"/>
+          </a:xfrm>
+          <a:prstGeom prst="rect">
+            <a:avLst/>
+          </a:prstGeom>
+          <a:noFill/>
+        </p:spPr>
+        <p:txBody>
+          <a:bodyPr wrap="square" rtlCol="0">
+            <a:spAutoFit/>
+          </a:bodyPr>
+          <a:lstStyle/>
+          <a:p>
+            <a:r>
+              <a:rPr lang="en-US" dirty="0">
+                <a:hlinkClick r:id="rId4"/>
+              </a:rPr>
+              <a:t>http://jeffreypalermo.com/blog/the-onion-architecture-part-1</a:t>
+            </a:r>
+            <a:r>
+              <a:rPr lang="en-US" dirty="0" smtClean="0">
+                <a:hlinkClick r:id="rId4"/>
+              </a:rPr>
+              <a:t>/</a:t>
+            </a:r>
+            <a:endParaRPr lang="en-US" dirty="0" smtClean="0"/>
+          </a:p>
+          <a:p>
+            <a:endParaRPr lang="en-US" dirty="0"/>
+          </a:p>
+          <a:p>
+            <a:r>
+              <a:rPr lang="en-US" dirty="0">
+                <a:hlinkClick r:id="rId5"/>
+              </a:rPr>
+              <a:t>http://</a:t>
+            </a:r>
+            <a:r>
+              <a:rPr lang="en-US" dirty="0" smtClean="0">
+                <a:hlinkClick r:id="rId5"/>
+              </a:rPr>
+              <a:t>alistair.cockburn.us/Hexagonal+architecture</a:t>
+            </a:r>
+            <a:endParaRPr lang="en-US" dirty="0" smtClean="0"/>
+          </a:p>
+          <a:p>
+            <a:endParaRPr lang="en-US" dirty="0"/>
+          </a:p>
+          <a:p>
+            <a:r>
+              <a:rPr lang="en-US" dirty="0">
+                <a:hlinkClick r:id="rId6"/>
+              </a:rPr>
+              <a:t>http://www.matthidinger.com/archive/2011/05/17/Onion-Architecture-code-and-slides-from-Chicago-Code-Camp.aspx</a:t>
+            </a:r>
+            <a:endParaRPr lang="en-US" dirty="0"/>
           </a:p>
         </p:txBody>
       </p:sp>
@@ -4340,6 +4637,13 @@
   <p:clrMapOvr>
     <a:masterClrMapping/>
   </p:clrMapOvr>
+  <p:timing>
+    <p:tnLst>
+      <p:par>
+        <p:cTn id="1" dur="indefinite" restart="never" nodeType="tmRoot"/>
+      </p:par>
+    </p:tnLst>
+  </p:timing>
 </p:sld>
 </file>
 

</xml_diff>